<commit_message>
Update Presentacion CLON KAHOOT.pptx
</commit_message>
<xml_diff>
--- a/Kahoot_Files_Beta_ADL/Presentacion CLON KAHOOT.pptx
+++ b/Kahoot_Files_Beta_ADL/Presentacion CLON KAHOOT.pptx
@@ -6,6 +6,9 @@
   </p:sldMasterIdLst>
   <p:sldIdLst>
     <p:sldId id="256" r:id="rId2"/>
+    <p:sldId id="257" r:id="rId3"/>
+    <p:sldId id="258" r:id="rId4"/>
+    <p:sldId id="259" r:id="rId5"/>
   </p:sldIdLst>
   <p:sldSz cx="12192000" cy="6858000"/>
   <p:notesSz cx="6858000" cy="9144000"/>
@@ -104,6 +107,11 @@
       </a:defRPr>
     </a:lvl9pPr>
   </p:defaultTextStyle>
+  <p:extLst>
+    <p:ext uri="{EFAFB233-063F-42B5-8137-9DF3F51BA10A}">
+      <p15:sldGuideLst xmlns:p15="http://schemas.microsoft.com/office/powerpoint/2012/main"/>
+    </p:ext>
+  </p:extLst>
 </p:presentation>
 </file>
 
@@ -111,19 +119,19 @@
 <pc:chgInfo xmlns:a="http://schemas.openxmlformats.org/drawingml/2006/main" xmlns:r="http://schemas.openxmlformats.org/officeDocument/2006/relationships" xmlns:ac="http://schemas.microsoft.com/office/drawing/2013/main/command" xmlns:pc="http://schemas.microsoft.com/office/powerpoint/2013/main/command">
   <pc:docChgLst>
     <pc:chgData name="YENI KATERINE CORDOBA VALENCIA" userId="a991a73ee19c1728" providerId="LiveId" clId="{34673879-890C-4951-81B8-33868B2EF45E}"/>
-    <pc:docChg chg="modSld">
-      <pc:chgData name="YENI KATERINE CORDOBA VALENCIA" userId="a991a73ee19c1728" providerId="LiveId" clId="{34673879-890C-4951-81B8-33868B2EF45E}" dt="2023-11-30T13:14:00.037" v="40" actId="120"/>
+    <pc:docChg chg="undo custSel addSld modSld">
+      <pc:chgData name="YENI KATERINE CORDOBA VALENCIA" userId="a991a73ee19c1728" providerId="LiveId" clId="{34673879-890C-4951-81B8-33868B2EF45E}" dt="2023-11-30T13:58:48.104" v="672" actId="680"/>
       <pc:docMkLst>
         <pc:docMk/>
       </pc:docMkLst>
-      <pc:sldChg chg="modSp mod setBg">
-        <pc:chgData name="YENI KATERINE CORDOBA VALENCIA" userId="a991a73ee19c1728" providerId="LiveId" clId="{34673879-890C-4951-81B8-33868B2EF45E}" dt="2023-11-30T13:14:00.037" v="40" actId="120"/>
+      <pc:sldChg chg="addSp modSp mod setBg">
+        <pc:chgData name="YENI KATERINE CORDOBA VALENCIA" userId="a991a73ee19c1728" providerId="LiveId" clId="{34673879-890C-4951-81B8-33868B2EF45E}" dt="2023-11-30T13:25:14.696" v="116" actId="1076"/>
         <pc:sldMkLst>
           <pc:docMk/>
           <pc:sldMk cId="1348224455" sldId="256"/>
         </pc:sldMkLst>
         <pc:spChg chg="mod">
-          <ac:chgData name="YENI KATERINE CORDOBA VALENCIA" userId="a991a73ee19c1728" providerId="LiveId" clId="{34673879-890C-4951-81B8-33868B2EF45E}" dt="2023-11-30T13:13:28.761" v="37" actId="20577"/>
+          <ac:chgData name="YENI KATERINE CORDOBA VALENCIA" userId="a991a73ee19c1728" providerId="LiveId" clId="{34673879-890C-4951-81B8-33868B2EF45E}" dt="2023-11-30T13:25:04.298" v="115" actId="20577"/>
           <ac:spMkLst>
             <pc:docMk/>
             <pc:sldMk cId="1348224455" sldId="256"/>
@@ -131,13 +139,162 @@
           </ac:spMkLst>
         </pc:spChg>
         <pc:spChg chg="mod">
-          <ac:chgData name="YENI KATERINE CORDOBA VALENCIA" userId="a991a73ee19c1728" providerId="LiveId" clId="{34673879-890C-4951-81B8-33868B2EF45E}" dt="2023-11-30T13:14:00.037" v="40" actId="120"/>
+          <ac:chgData name="YENI KATERINE CORDOBA VALENCIA" userId="a991a73ee19c1728" providerId="LiveId" clId="{34673879-890C-4951-81B8-33868B2EF45E}" dt="2023-11-30T13:17:21.320" v="44" actId="2711"/>
           <ac:spMkLst>
             <pc:docMk/>
             <pc:sldMk cId="1348224455" sldId="256"/>
             <ac:spMk id="3" creationId="{793815F3-2819-4E8B-EC63-39F42E0AAB6F}"/>
           </ac:spMkLst>
         </pc:spChg>
+        <pc:picChg chg="add mod">
+          <ac:chgData name="YENI KATERINE CORDOBA VALENCIA" userId="a991a73ee19c1728" providerId="LiveId" clId="{34673879-890C-4951-81B8-33868B2EF45E}" dt="2023-11-30T13:25:14.696" v="116" actId="1076"/>
+          <ac:picMkLst>
+            <pc:docMk/>
+            <pc:sldMk cId="1348224455" sldId="256"/>
+            <ac:picMk id="5" creationId="{D40277F6-BB00-AFF4-BA47-EE5592A348C0}"/>
+          </ac:picMkLst>
+        </pc:picChg>
+      </pc:sldChg>
+      <pc:sldChg chg="addSp delSp modSp new mod setBg">
+        <pc:chgData name="YENI KATERINE CORDOBA VALENCIA" userId="a991a73ee19c1728" providerId="LiveId" clId="{34673879-890C-4951-81B8-33868B2EF45E}" dt="2023-11-30T13:28:54.837" v="167" actId="20577"/>
+        <pc:sldMkLst>
+          <pc:docMk/>
+          <pc:sldMk cId="4145735452" sldId="257"/>
+        </pc:sldMkLst>
+        <pc:spChg chg="mod">
+          <ac:chgData name="YENI KATERINE CORDOBA VALENCIA" userId="a991a73ee19c1728" providerId="LiveId" clId="{34673879-890C-4951-81B8-33868B2EF45E}" dt="2023-11-30T13:28:54.837" v="167" actId="20577"/>
+          <ac:spMkLst>
+            <pc:docMk/>
+            <pc:sldMk cId="4145735452" sldId="257"/>
+            <ac:spMk id="2" creationId="{561FF3BA-B4E1-7855-54CD-C54955F19355}"/>
+          </ac:spMkLst>
+        </pc:spChg>
+        <pc:spChg chg="mod">
+          <ac:chgData name="YENI KATERINE CORDOBA VALENCIA" userId="a991a73ee19c1728" providerId="LiveId" clId="{34673879-890C-4951-81B8-33868B2EF45E}" dt="2023-11-30T13:28:18.839" v="160" actId="403"/>
+          <ac:spMkLst>
+            <pc:docMk/>
+            <pc:sldMk cId="4145735452" sldId="257"/>
+            <ac:spMk id="3" creationId="{A0E3A1D3-4CEE-752B-C61B-8C9994062934}"/>
+          </ac:spMkLst>
+        </pc:spChg>
+        <pc:graphicFrameChg chg="add del modGraphic">
+          <ac:chgData name="YENI KATERINE CORDOBA VALENCIA" userId="a991a73ee19c1728" providerId="LiveId" clId="{34673879-890C-4951-81B8-33868B2EF45E}" dt="2023-11-30T13:25:53.939" v="118" actId="478"/>
+          <ac:graphicFrameMkLst>
+            <pc:docMk/>
+            <pc:sldMk cId="4145735452" sldId="257"/>
+            <ac:graphicFrameMk id="5" creationId="{1A71C3C3-5AB1-0A56-CA2C-D02EAD6BB9C0}"/>
+          </ac:graphicFrameMkLst>
+        </pc:graphicFrameChg>
+        <pc:picChg chg="add mod">
+          <ac:chgData name="YENI KATERINE CORDOBA VALENCIA" userId="a991a73ee19c1728" providerId="LiveId" clId="{34673879-890C-4951-81B8-33868B2EF45E}" dt="2023-11-30T13:28:46.627" v="162" actId="1076"/>
+          <ac:picMkLst>
+            <pc:docMk/>
+            <pc:sldMk cId="4145735452" sldId="257"/>
+            <ac:picMk id="6" creationId="{CDDF041B-B0D6-F872-6FCC-50CA8460849A}"/>
+          </ac:picMkLst>
+        </pc:picChg>
+      </pc:sldChg>
+      <pc:sldChg chg="addSp delSp modSp new mod">
+        <pc:chgData name="YENI KATERINE CORDOBA VALENCIA" userId="a991a73ee19c1728" providerId="LiveId" clId="{34673879-890C-4951-81B8-33868B2EF45E}" dt="2023-11-30T13:58:04.950" v="671" actId="20577"/>
+        <pc:sldMkLst>
+          <pc:docMk/>
+          <pc:sldMk cId="406387641" sldId="258"/>
+        </pc:sldMkLst>
+        <pc:spChg chg="mod">
+          <ac:chgData name="YENI KATERINE CORDOBA VALENCIA" userId="a991a73ee19c1728" providerId="LiveId" clId="{34673879-890C-4951-81B8-33868B2EF45E}" dt="2023-11-30T13:35:54.733" v="219" actId="207"/>
+          <ac:spMkLst>
+            <pc:docMk/>
+            <pc:sldMk cId="406387641" sldId="258"/>
+            <ac:spMk id="2" creationId="{F952E4E8-310C-478C-283E-6C6DCC9A8EB7}"/>
+          </ac:spMkLst>
+        </pc:spChg>
+        <pc:spChg chg="del mod">
+          <ac:chgData name="YENI KATERINE CORDOBA VALENCIA" userId="a991a73ee19c1728" providerId="LiveId" clId="{34673879-890C-4951-81B8-33868B2EF45E}" dt="2023-11-30T13:44:21.164" v="322" actId="478"/>
+          <ac:spMkLst>
+            <pc:docMk/>
+            <pc:sldMk cId="406387641" sldId="258"/>
+            <ac:spMk id="3" creationId="{EB695567-F127-C891-B144-BD3E2D6A2E4D}"/>
+          </ac:spMkLst>
+        </pc:spChg>
+        <pc:spChg chg="add del mod">
+          <ac:chgData name="YENI KATERINE CORDOBA VALENCIA" userId="a991a73ee19c1728" providerId="LiveId" clId="{34673879-890C-4951-81B8-33868B2EF45E}" dt="2023-11-30T13:44:29.236" v="324" actId="478"/>
+          <ac:spMkLst>
+            <pc:docMk/>
+            <pc:sldMk cId="406387641" sldId="258"/>
+            <ac:spMk id="5" creationId="{6602ABC4-B028-73D5-4A62-06A15F0EB001}"/>
+          </ac:spMkLst>
+        </pc:spChg>
+        <pc:spChg chg="add mod">
+          <ac:chgData name="YENI KATERINE CORDOBA VALENCIA" userId="a991a73ee19c1728" providerId="LiveId" clId="{34673879-890C-4951-81B8-33868B2EF45E}" dt="2023-11-30T13:50:06.254" v="412" actId="1076"/>
+          <ac:spMkLst>
+            <pc:docMk/>
+            <pc:sldMk cId="406387641" sldId="258"/>
+            <ac:spMk id="6" creationId="{AEF705A7-0149-0CC4-0BE6-92703FF0545C}"/>
+          </ac:spMkLst>
+        </pc:spChg>
+        <pc:spChg chg="add mod">
+          <ac:chgData name="YENI KATERINE CORDOBA VALENCIA" userId="a991a73ee19c1728" providerId="LiveId" clId="{34673879-890C-4951-81B8-33868B2EF45E}" dt="2023-11-30T13:56:16.731" v="533"/>
+          <ac:spMkLst>
+            <pc:docMk/>
+            <pc:sldMk cId="406387641" sldId="258"/>
+            <ac:spMk id="9" creationId="{1593180C-7650-0907-AE33-5F123A083C4E}"/>
+          </ac:spMkLst>
+        </pc:spChg>
+        <pc:spChg chg="add mod">
+          <ac:chgData name="YENI KATERINE CORDOBA VALENCIA" userId="a991a73ee19c1728" providerId="LiveId" clId="{34673879-890C-4951-81B8-33868B2EF45E}" dt="2023-11-30T13:58:04.950" v="671" actId="20577"/>
+          <ac:spMkLst>
+            <pc:docMk/>
+            <pc:sldMk cId="406387641" sldId="258"/>
+            <ac:spMk id="11" creationId="{BA6228E8-D176-3BDC-5F41-96FF1C35005D}"/>
+          </ac:spMkLst>
+        </pc:spChg>
+        <pc:picChg chg="add del mod">
+          <ac:chgData name="YENI KATERINE CORDOBA VALENCIA" userId="a991a73ee19c1728" providerId="LiveId" clId="{34673879-890C-4951-81B8-33868B2EF45E}" dt="2023-11-30T13:52:52.081" v="434" actId="478"/>
+          <ac:picMkLst>
+            <pc:docMk/>
+            <pc:sldMk cId="406387641" sldId="258"/>
+            <ac:picMk id="7" creationId="{13ED6376-932F-2E4F-53DA-FF849A22E932}"/>
+          </ac:picMkLst>
+        </pc:picChg>
+        <pc:picChg chg="add del mod">
+          <ac:chgData name="YENI KATERINE CORDOBA VALENCIA" userId="a991a73ee19c1728" providerId="LiveId" clId="{34673879-890C-4951-81B8-33868B2EF45E}" dt="2023-11-30T13:38:46.933" v="286"/>
+          <ac:picMkLst>
+            <pc:docMk/>
+            <pc:sldMk cId="406387641" sldId="258"/>
+            <ac:picMk id="1026" creationId="{609AA398-5EFF-FA8E-B6A8-F63ED46DD635}"/>
+          </ac:picMkLst>
+        </pc:picChg>
+        <pc:picChg chg="add mod">
+          <ac:chgData name="YENI KATERINE CORDOBA VALENCIA" userId="a991a73ee19c1728" providerId="LiveId" clId="{34673879-890C-4951-81B8-33868B2EF45E}" dt="2023-11-30T13:49:53.852" v="411" actId="1076"/>
+          <ac:picMkLst>
+            <pc:docMk/>
+            <pc:sldMk cId="406387641" sldId="258"/>
+            <ac:picMk id="1028" creationId="{274D62B3-7127-7184-D21F-30194C87644F}"/>
+          </ac:picMkLst>
+        </pc:picChg>
+        <pc:picChg chg="add mod">
+          <ac:chgData name="YENI KATERINE CORDOBA VALENCIA" userId="a991a73ee19c1728" providerId="LiveId" clId="{34673879-890C-4951-81B8-33868B2EF45E}" dt="2023-11-30T13:55:39.870" v="529" actId="1076"/>
+          <ac:picMkLst>
+            <pc:docMk/>
+            <pc:sldMk cId="406387641" sldId="258"/>
+            <ac:picMk id="1030" creationId="{AB413885-42B9-FD9B-9D93-13E53DD745B3}"/>
+          </ac:picMkLst>
+        </pc:picChg>
+        <pc:picChg chg="add mod">
+          <ac:chgData name="YENI KATERINE CORDOBA VALENCIA" userId="a991a73ee19c1728" providerId="LiveId" clId="{34673879-890C-4951-81B8-33868B2EF45E}" dt="2023-11-30T13:55:57.185" v="531" actId="1076"/>
+          <ac:picMkLst>
+            <pc:docMk/>
+            <pc:sldMk cId="406387641" sldId="258"/>
+            <ac:picMk id="1032" creationId="{81E5505C-A57E-1D10-4028-274CBA39A752}"/>
+          </ac:picMkLst>
+        </pc:picChg>
+      </pc:sldChg>
+      <pc:sldChg chg="new">
+        <pc:chgData name="YENI KATERINE CORDOBA VALENCIA" userId="a991a73ee19c1728" providerId="LiveId" clId="{34673879-890C-4951-81B8-33868B2EF45E}" dt="2023-11-30T13:58:48.104" v="672" actId="680"/>
+        <pc:sldMkLst>
+          <pc:docMk/>
+          <pc:sldMk cId="4067705731" sldId="259"/>
+        </pc:sldMkLst>
       </pc:sldChg>
     </pc:docChg>
   </pc:docChgLst>
@@ -3423,7 +3580,7 @@
                 </a:solidFill>
                 <a:latin typeface="Arial Rounded MT Bold" panose="020F0704030504030204" pitchFamily="34" charset="0"/>
               </a:rPr>
-              <a:t>CLON DE KAHOOT</a:t>
+              <a:t>CLON DE					</a:t>
             </a:r>
             <a:endParaRPr lang="es-CO" b="1" dirty="0">
               <a:solidFill>
@@ -3454,8 +3611,120 @@
         </p:nvSpPr>
         <p:spPr/>
         <p:txBody>
-          <a:bodyPr/>
-          <a:lstStyle/>
+          <a:bodyPr>
+            <a:normAutofit fontScale="92500" lnSpcReduction="10000"/>
+          </a:bodyPr>
+          <a:lstStyle/>
+          <a:p>
+            <a:pPr algn="ctr" rtl="0" fontAlgn="base"/>
+            <a:r>
+              <a:rPr lang="es-CO" sz="1800" b="0" i="0" dirty="0">
+                <a:solidFill>
+                  <a:schemeClr val="bg1"/>
+                </a:solidFill>
+                <a:effectLst/>
+                <a:latin typeface="Arial Narrow" panose="020B0606020202030204" pitchFamily="34" charset="0"/>
+              </a:rPr>
+              <a:t>YURLEIVY MOSQUERA RODRÍGUEZ </a:t>
+            </a:r>
+            <a:endParaRPr lang="es-CO" b="0" i="0" dirty="0">
+              <a:solidFill>
+                <a:schemeClr val="bg1"/>
+              </a:solidFill>
+              <a:effectLst/>
+              <a:latin typeface="Arial Narrow" panose="020B0606020202030204" pitchFamily="34" charset="0"/>
+            </a:endParaRPr>
+          </a:p>
+          <a:p>
+            <a:pPr algn="ctr" rtl="0" fontAlgn="base"/>
+            <a:r>
+              <a:rPr lang="es-CO" sz="1800" b="0" i="0" dirty="0">
+                <a:solidFill>
+                  <a:schemeClr val="bg1"/>
+                </a:solidFill>
+                <a:effectLst/>
+                <a:latin typeface="Arial Narrow" panose="020B0606020202030204" pitchFamily="34" charset="0"/>
+              </a:rPr>
+              <a:t>EDUAR SAMIR CHALÁ CUESTA </a:t>
+            </a:r>
+            <a:endParaRPr lang="es-CO" b="0" i="0" dirty="0">
+              <a:solidFill>
+                <a:schemeClr val="bg1"/>
+              </a:solidFill>
+              <a:effectLst/>
+              <a:latin typeface="Arial Narrow" panose="020B0606020202030204" pitchFamily="34" charset="0"/>
+            </a:endParaRPr>
+          </a:p>
+          <a:p>
+            <a:pPr algn="ctr" rtl="0" fontAlgn="base"/>
+            <a:r>
+              <a:rPr lang="es-CO" sz="1800" b="0" i="0" dirty="0">
+                <a:solidFill>
+                  <a:schemeClr val="bg1"/>
+                </a:solidFill>
+                <a:effectLst/>
+                <a:latin typeface="Arial Narrow" panose="020B0606020202030204" pitchFamily="34" charset="0"/>
+              </a:rPr>
+              <a:t>JHODYER ANDRÉS IBARGUEN OCHOA </a:t>
+            </a:r>
+            <a:endParaRPr lang="es-CO" b="0" i="0" dirty="0">
+              <a:solidFill>
+                <a:schemeClr val="bg1"/>
+              </a:solidFill>
+              <a:effectLst/>
+              <a:latin typeface="Arial Narrow" panose="020B0606020202030204" pitchFamily="34" charset="0"/>
+            </a:endParaRPr>
+          </a:p>
+          <a:p>
+            <a:pPr algn="ctr" rtl="0" fontAlgn="base"/>
+            <a:r>
+              <a:rPr lang="es-CO" sz="1800" b="0" i="0" dirty="0">
+                <a:solidFill>
+                  <a:schemeClr val="bg1"/>
+                </a:solidFill>
+                <a:effectLst/>
+                <a:latin typeface="Arial Narrow" panose="020B0606020202030204" pitchFamily="34" charset="0"/>
+              </a:rPr>
+              <a:t>JHERALDYN NICOL DEDIEGO MORENO </a:t>
+            </a:r>
+            <a:endParaRPr lang="es-CO" b="0" i="0" dirty="0">
+              <a:solidFill>
+                <a:schemeClr val="bg1"/>
+              </a:solidFill>
+              <a:effectLst/>
+              <a:latin typeface="Arial Narrow" panose="020B0606020202030204" pitchFamily="34" charset="0"/>
+            </a:endParaRPr>
+          </a:p>
+          <a:p>
+            <a:pPr algn="ctr" rtl="0" fontAlgn="base"/>
+            <a:r>
+              <a:rPr lang="es-CO" sz="1800" b="0" i="0" dirty="0">
+                <a:solidFill>
+                  <a:schemeClr val="bg1"/>
+                </a:solidFill>
+                <a:effectLst/>
+                <a:latin typeface="Arial Narrow" panose="020B0606020202030204" pitchFamily="34" charset="0"/>
+              </a:rPr>
+              <a:t>YENI KATERINE CÓRDOBA VALENCIA </a:t>
+            </a:r>
+            <a:r>
+              <a:rPr lang="es-CO" sz="1800" b="0" i="0" dirty="0">
+                <a:solidFill>
+                  <a:srgbClr val="000000"/>
+                </a:solidFill>
+                <a:effectLst/>
+                <a:latin typeface="Arial" panose="020B0604020202020204" pitchFamily="34" charset="0"/>
+              </a:rPr>
+              <a:t> </a:t>
+            </a:r>
+            <a:endParaRPr lang="es-CO" b="0" i="0" dirty="0">
+              <a:solidFill>
+                <a:srgbClr val="000000"/>
+              </a:solidFill>
+              <a:effectLst/>
+              <a:latin typeface="Segoe UI" panose="020B0502040204020203" pitchFamily="34" charset="0"/>
+            </a:endParaRPr>
+          </a:p>
           <a:p>
             <a:pPr algn="l"/>
             <a:endParaRPr lang="es-CO" dirty="0">
@@ -3467,10 +3736,660 @@
           </a:p>
         </p:txBody>
       </p:sp>
+      <p:pic>
+        <p:nvPicPr>
+          <p:cNvPr id="5" name="Imagen 4">
+            <a:extLst>
+              <a:ext uri="{FF2B5EF4-FFF2-40B4-BE49-F238E27FC236}">
+                <a16:creationId xmlns:a16="http://schemas.microsoft.com/office/drawing/2014/main" id="{D40277F6-BB00-AFF4-BA47-EE5592A348C0}"/>
+              </a:ext>
+            </a:extLst>
+          </p:cNvPr>
+          <p:cNvPicPr>
+            <a:picLocks noChangeAspect="1"/>
+          </p:cNvPicPr>
+          <p:nvPr/>
+        </p:nvPicPr>
+        <p:blipFill>
+          <a:blip r:embed="rId3">
+            <a:lum bright="70000" contrast="-70000"/>
+            <a:extLst>
+              <a:ext uri="{28A0092B-C50C-407E-A947-70E740481C1C}">
+                <a14:useLocalDpi xmlns:a14="http://schemas.microsoft.com/office/drawing/2010/main" val="0"/>
+              </a:ext>
+            </a:extLst>
+          </a:blip>
+          <a:stretch>
+            <a:fillRect/>
+          </a:stretch>
+        </p:blipFill>
+        <p:spPr>
+          <a:xfrm>
+            <a:off x="6321084" y="2266188"/>
+            <a:ext cx="3413760" cy="1162812"/>
+          </a:xfrm>
+          <a:prstGeom prst="rect">
+            <a:avLst/>
+          </a:prstGeom>
+        </p:spPr>
+      </p:pic>
     </p:spTree>
     <p:extLst>
       <p:ext uri="{BB962C8B-B14F-4D97-AF65-F5344CB8AC3E}">
         <p14:creationId xmlns:p14="http://schemas.microsoft.com/office/powerpoint/2010/main" val="1348224455"/>
+      </p:ext>
+    </p:extLst>
+  </p:cSld>
+  <p:clrMapOvr>
+    <a:masterClrMapping/>
+  </p:clrMapOvr>
+</p:sld>
+</file>
+
+<file path=ppt/slides/slide2.xml><?xml version="1.0" encoding="utf-8"?>
+<p:sld xmlns:a="http://schemas.openxmlformats.org/drawingml/2006/main" xmlns:r="http://schemas.openxmlformats.org/officeDocument/2006/relationships" xmlns:p="http://schemas.openxmlformats.org/presentationml/2006/main">
+  <p:cSld>
+    <p:bg>
+      <p:bgPr>
+        <a:blipFill dpi="0" rotWithShape="1">
+          <a:blip r:embed="rId2">
+            <a:lum/>
+          </a:blip>
+          <a:srcRect/>
+          <a:stretch>
+            <a:fillRect l="-13000" r="-13000"/>
+          </a:stretch>
+        </a:blipFill>
+        <a:effectLst/>
+      </p:bgPr>
+    </p:bg>
+    <p:spTree>
+      <p:nvGrpSpPr>
+        <p:cNvPr id="1" name=""/>
+        <p:cNvGrpSpPr/>
+        <p:nvPr/>
+      </p:nvGrpSpPr>
+      <p:grpSpPr>
+        <a:xfrm>
+          <a:off x="0" y="0"/>
+          <a:ext cx="0" cy="0"/>
+          <a:chOff x="0" y="0"/>
+          <a:chExt cx="0" cy="0"/>
+        </a:xfrm>
+      </p:grpSpPr>
+      <p:pic>
+        <p:nvPicPr>
+          <p:cNvPr id="6" name="Imagen 5">
+            <a:extLst>
+              <a:ext uri="{FF2B5EF4-FFF2-40B4-BE49-F238E27FC236}">
+                <a16:creationId xmlns:a16="http://schemas.microsoft.com/office/drawing/2014/main" id="{CDDF041B-B0D6-F872-6FCC-50CA8460849A}"/>
+              </a:ext>
+            </a:extLst>
+          </p:cNvPr>
+          <p:cNvPicPr>
+            <a:picLocks noChangeAspect="1"/>
+          </p:cNvPicPr>
+          <p:nvPr/>
+        </p:nvPicPr>
+        <p:blipFill>
+          <a:blip r:embed="rId3"/>
+          <a:stretch>
+            <a:fillRect/>
+          </a:stretch>
+        </p:blipFill>
+        <p:spPr>
+          <a:xfrm>
+            <a:off x="1420689" y="681037"/>
+            <a:ext cx="3414056" cy="1164437"/>
+          </a:xfrm>
+          <a:prstGeom prst="rect">
+            <a:avLst/>
+          </a:prstGeom>
+        </p:spPr>
+      </p:pic>
+      <p:sp>
+        <p:nvSpPr>
+          <p:cNvPr id="2" name="Título 1">
+            <a:extLst>
+              <a:ext uri="{FF2B5EF4-FFF2-40B4-BE49-F238E27FC236}">
+                <a16:creationId xmlns:a16="http://schemas.microsoft.com/office/drawing/2014/main" id="{561FF3BA-B4E1-7855-54CD-C54955F19355}"/>
+              </a:ext>
+            </a:extLst>
+          </p:cNvPr>
+          <p:cNvSpPr>
+            <a:spLocks noGrp="1"/>
+          </p:cNvSpPr>
+          <p:nvPr>
+            <p:ph type="title"/>
+          </p:nvPr>
+        </p:nvSpPr>
+        <p:spPr/>
+        <p:txBody>
+          <a:bodyPr/>
+          <a:lstStyle/>
+          <a:p>
+            <a:r>
+              <a:rPr lang="es-ES" dirty="0"/>
+              <a:t>					</a:t>
+            </a:r>
+            <a:endParaRPr lang="es-CO" dirty="0"/>
+          </a:p>
+        </p:txBody>
+      </p:sp>
+      <p:sp>
+        <p:nvSpPr>
+          <p:cNvPr id="3" name="Marcador de contenido 2">
+            <a:extLst>
+              <a:ext uri="{FF2B5EF4-FFF2-40B4-BE49-F238E27FC236}">
+                <a16:creationId xmlns:a16="http://schemas.microsoft.com/office/drawing/2014/main" id="{A0E3A1D3-4CEE-752B-C61B-8C9994062934}"/>
+              </a:ext>
+            </a:extLst>
+          </p:cNvPr>
+          <p:cNvSpPr>
+            <a:spLocks noGrp="1"/>
+          </p:cNvSpPr>
+          <p:nvPr>
+            <p:ph idx="1"/>
+          </p:nvPr>
+        </p:nvSpPr>
+        <p:spPr/>
+        <p:txBody>
+          <a:bodyPr/>
+          <a:lstStyle/>
+          <a:p>
+            <a:pPr marL="0" indent="0" algn="just" rtl="0" fontAlgn="base">
+              <a:buNone/>
+            </a:pPr>
+            <a:r>
+              <a:rPr lang="es-ES" sz="3200" dirty="0">
+                <a:solidFill>
+                  <a:schemeClr val="bg1"/>
+                </a:solidFill>
+                <a:latin typeface="Bahnschrift" panose="020B0502040204020203" pitchFamily="34" charset="0"/>
+              </a:rPr>
+              <a:t>E</a:t>
+            </a:r>
+            <a:r>
+              <a:rPr lang="es-ES" sz="3200" b="0" i="0" dirty="0">
+                <a:solidFill>
+                  <a:schemeClr val="bg1"/>
+                </a:solidFill>
+                <a:effectLst/>
+                <a:latin typeface="Bahnschrift" panose="020B0502040204020203" pitchFamily="34" charset="0"/>
+              </a:rPr>
+              <a:t>s una plataforma de aprendizaje mixto basado en el juego, permitiendo a los educadores y estudiantes investigar, crear, colaborar y compartir conocimientos. </a:t>
+            </a:r>
+            <a:endParaRPr lang="es-ES" sz="4400" dirty="0">
+              <a:solidFill>
+                <a:schemeClr val="bg1"/>
+              </a:solidFill>
+              <a:latin typeface="Bahnschrift" panose="020B0502040204020203" pitchFamily="34" charset="0"/>
+            </a:endParaRPr>
+          </a:p>
+          <a:p>
+            <a:pPr marL="0" indent="0" algn="just" rtl="0" fontAlgn="base">
+              <a:buNone/>
+            </a:pPr>
+            <a:r>
+              <a:rPr lang="es-ES" sz="3200" b="0" i="0" dirty="0">
+                <a:solidFill>
+                  <a:schemeClr val="bg1"/>
+                </a:solidFill>
+                <a:effectLst/>
+                <a:latin typeface="Bahnschrift" panose="020B0502040204020203" pitchFamily="34" charset="0"/>
+              </a:rPr>
+              <a:t>Para la elaboración del proyecto se tuvo en cuenta los módulos finalizados anteriormente durante el proceso de formación (HTML, CSS y JAVASCRIPT). </a:t>
+            </a:r>
+            <a:r>
+              <a:rPr lang="es-ES" sz="1800" b="0" i="0" dirty="0">
+                <a:solidFill>
+                  <a:srgbClr val="000000"/>
+                </a:solidFill>
+                <a:effectLst/>
+                <a:latin typeface="Arial" panose="020B0604020202020204" pitchFamily="34" charset="0"/>
+              </a:rPr>
+              <a:t> </a:t>
+            </a:r>
+            <a:endParaRPr lang="es-ES" b="0" i="0" dirty="0">
+              <a:solidFill>
+                <a:srgbClr val="000000"/>
+              </a:solidFill>
+              <a:effectLst/>
+              <a:latin typeface="Segoe UI" panose="020B0502040204020203" pitchFamily="34" charset="0"/>
+            </a:endParaRPr>
+          </a:p>
+          <a:p>
+            <a:endParaRPr lang="es-CO" dirty="0"/>
+          </a:p>
+        </p:txBody>
+      </p:sp>
+    </p:spTree>
+    <p:extLst>
+      <p:ext uri="{BB962C8B-B14F-4D97-AF65-F5344CB8AC3E}">
+        <p14:creationId xmlns:p14="http://schemas.microsoft.com/office/powerpoint/2010/main" val="4145735452"/>
+      </p:ext>
+    </p:extLst>
+  </p:cSld>
+  <p:clrMapOvr>
+    <a:masterClrMapping/>
+  </p:clrMapOvr>
+</p:sld>
+</file>
+
+<file path=ppt/slides/slide3.xml><?xml version="1.0" encoding="utf-8"?>
+<p:sld xmlns:a="http://schemas.openxmlformats.org/drawingml/2006/main" xmlns:r="http://schemas.openxmlformats.org/officeDocument/2006/relationships" xmlns:p="http://schemas.openxmlformats.org/presentationml/2006/main">
+  <p:cSld>
+    <p:spTree>
+      <p:nvGrpSpPr>
+        <p:cNvPr id="1" name=""/>
+        <p:cNvGrpSpPr/>
+        <p:nvPr/>
+      </p:nvGrpSpPr>
+      <p:grpSpPr>
+        <a:xfrm>
+          <a:off x="0" y="0"/>
+          <a:ext cx="0" cy="0"/>
+          <a:chOff x="0" y="0"/>
+          <a:chExt cx="0" cy="0"/>
+        </a:xfrm>
+      </p:grpSpPr>
+      <p:sp>
+        <p:nvSpPr>
+          <p:cNvPr id="2" name="Título 1">
+            <a:extLst>
+              <a:ext uri="{FF2B5EF4-FFF2-40B4-BE49-F238E27FC236}">
+                <a16:creationId xmlns:a16="http://schemas.microsoft.com/office/drawing/2014/main" id="{F952E4E8-310C-478C-283E-6C6DCC9A8EB7}"/>
+              </a:ext>
+            </a:extLst>
+          </p:cNvPr>
+          <p:cNvSpPr>
+            <a:spLocks noGrp="1"/>
+          </p:cNvSpPr>
+          <p:nvPr>
+            <p:ph type="title"/>
+          </p:nvPr>
+        </p:nvSpPr>
+        <p:spPr/>
+        <p:txBody>
+          <a:bodyPr>
+            <a:normAutofit/>
+          </a:bodyPr>
+          <a:lstStyle/>
+          <a:p>
+            <a:pPr algn="just"/>
+            <a:r>
+              <a:rPr lang="es-ES" sz="3600" dirty="0">
+                <a:solidFill>
+                  <a:srgbClr val="7030A0"/>
+                </a:solidFill>
+                <a:latin typeface="Arial Rounded MT Bold" panose="020F0704030504030204" pitchFamily="34" charset="0"/>
+              </a:rPr>
+              <a:t>IDENTIFICACIÓN DE ELEMENTOS A CLONAR</a:t>
+            </a:r>
+            <a:endParaRPr lang="es-CO" sz="3600" dirty="0">
+              <a:solidFill>
+                <a:srgbClr val="7030A0"/>
+              </a:solidFill>
+              <a:latin typeface="Arial Rounded MT Bold" panose="020F0704030504030204" pitchFamily="34" charset="0"/>
+            </a:endParaRPr>
+          </a:p>
+        </p:txBody>
+      </p:sp>
+      <p:pic>
+        <p:nvPicPr>
+          <p:cNvPr id="1028" name="Picture 4">
+            <a:extLst>
+              <a:ext uri="{FF2B5EF4-FFF2-40B4-BE49-F238E27FC236}">
+                <a16:creationId xmlns:a16="http://schemas.microsoft.com/office/drawing/2014/main" id="{274D62B3-7127-7184-D21F-30194C87644F}"/>
+              </a:ext>
+            </a:extLst>
+          </p:cNvPr>
+          <p:cNvPicPr>
+            <a:picLocks noChangeAspect="1" noChangeArrowheads="1"/>
+          </p:cNvPicPr>
+          <p:nvPr/>
+        </p:nvPicPr>
+        <p:blipFill>
+          <a:blip r:embed="rId2">
+            <a:extLst>
+              <a:ext uri="{28A0092B-C50C-407E-A947-70E740481C1C}">
+                <a14:useLocalDpi xmlns:a14="http://schemas.microsoft.com/office/drawing/2010/main" val="0"/>
+              </a:ext>
+            </a:extLst>
+          </a:blip>
+          <a:srcRect/>
+          <a:stretch>
+            <a:fillRect/>
+          </a:stretch>
+        </p:blipFill>
+        <p:spPr bwMode="auto">
+          <a:xfrm>
+            <a:off x="956604" y="1690688"/>
+            <a:ext cx="4312094" cy="1948303"/>
+          </a:xfrm>
+          <a:prstGeom prst="rect">
+            <a:avLst/>
+          </a:prstGeom>
+          <a:noFill/>
+          <a:extLst>
+            <a:ext uri="{909E8E84-426E-40DD-AFC4-6F175D3DCCD1}">
+              <a14:hiddenFill xmlns:a14="http://schemas.microsoft.com/office/drawing/2010/main">
+                <a:solidFill>
+                  <a:srgbClr val="FFFFFF"/>
+                </a:solidFill>
+              </a14:hiddenFill>
+            </a:ext>
+          </a:extLst>
+        </p:spPr>
+      </p:pic>
+      <p:pic>
+        <p:nvPicPr>
+          <p:cNvPr id="1030" name="Picture 6">
+            <a:extLst>
+              <a:ext uri="{FF2B5EF4-FFF2-40B4-BE49-F238E27FC236}">
+                <a16:creationId xmlns:a16="http://schemas.microsoft.com/office/drawing/2014/main" id="{AB413885-42B9-FD9B-9D93-13E53DD745B3}"/>
+              </a:ext>
+            </a:extLst>
+          </p:cNvPr>
+          <p:cNvPicPr>
+            <a:picLocks noChangeAspect="1" noChangeArrowheads="1"/>
+          </p:cNvPicPr>
+          <p:nvPr/>
+        </p:nvPicPr>
+        <p:blipFill>
+          <a:blip r:embed="rId3">
+            <a:extLst>
+              <a:ext uri="{28A0092B-C50C-407E-A947-70E740481C1C}">
+                <a14:useLocalDpi xmlns:a14="http://schemas.microsoft.com/office/drawing/2010/main" val="0"/>
+              </a:ext>
+            </a:extLst>
+          </a:blip>
+          <a:srcRect/>
+          <a:stretch>
+            <a:fillRect/>
+          </a:stretch>
+        </p:blipFill>
+        <p:spPr bwMode="auto">
+          <a:xfrm>
+            <a:off x="6302325" y="2260434"/>
+            <a:ext cx="4312095" cy="1953918"/>
+          </a:xfrm>
+          <a:prstGeom prst="rect">
+            <a:avLst/>
+          </a:prstGeom>
+          <a:noFill/>
+          <a:extLst>
+            <a:ext uri="{909E8E84-426E-40DD-AFC4-6F175D3DCCD1}">
+              <a14:hiddenFill xmlns:a14="http://schemas.microsoft.com/office/drawing/2010/main">
+                <a:solidFill>
+                  <a:srgbClr val="FFFFFF"/>
+                </a:solidFill>
+              </a14:hiddenFill>
+            </a:ext>
+          </a:extLst>
+        </p:spPr>
+      </p:pic>
+      <p:pic>
+        <p:nvPicPr>
+          <p:cNvPr id="1032" name="Picture 8">
+            <a:extLst>
+              <a:ext uri="{FF2B5EF4-FFF2-40B4-BE49-F238E27FC236}">
+                <a16:creationId xmlns:a16="http://schemas.microsoft.com/office/drawing/2014/main" id="{81E5505C-A57E-1D10-4028-274CBA39A752}"/>
+              </a:ext>
+            </a:extLst>
+          </p:cNvPr>
+          <p:cNvPicPr>
+            <a:picLocks noChangeAspect="1" noChangeArrowheads="1"/>
+          </p:cNvPicPr>
+          <p:nvPr/>
+        </p:nvPicPr>
+        <p:blipFill>
+          <a:blip r:embed="rId4">
+            <a:extLst>
+              <a:ext uri="{28A0092B-C50C-407E-A947-70E740481C1C}">
+                <a14:useLocalDpi xmlns:a14="http://schemas.microsoft.com/office/drawing/2010/main" val="0"/>
+              </a:ext>
+            </a:extLst>
+          </a:blip>
+          <a:srcRect/>
+          <a:stretch>
+            <a:fillRect/>
+          </a:stretch>
+        </p:blipFill>
+        <p:spPr bwMode="auto">
+          <a:xfrm>
+            <a:off x="2638864" y="4660208"/>
+            <a:ext cx="4312094" cy="1953918"/>
+          </a:xfrm>
+          <a:prstGeom prst="rect">
+            <a:avLst/>
+          </a:prstGeom>
+          <a:noFill/>
+          <a:extLst>
+            <a:ext uri="{909E8E84-426E-40DD-AFC4-6F175D3DCCD1}">
+              <a14:hiddenFill xmlns:a14="http://schemas.microsoft.com/office/drawing/2010/main">
+                <a:solidFill>
+                  <a:srgbClr val="FFFFFF"/>
+                </a:solidFill>
+              </a14:hiddenFill>
+            </a:ext>
+          </a:extLst>
+        </p:spPr>
+      </p:pic>
+      <p:sp>
+        <p:nvSpPr>
+          <p:cNvPr id="6" name="CuadroTexto 5">
+            <a:extLst>
+              <a:ext uri="{FF2B5EF4-FFF2-40B4-BE49-F238E27FC236}">
+                <a16:creationId xmlns:a16="http://schemas.microsoft.com/office/drawing/2014/main" id="{AEF705A7-0149-0CC4-0BE6-92703FF0545C}"/>
+              </a:ext>
+            </a:extLst>
+          </p:cNvPr>
+          <p:cNvSpPr txBox="1"/>
+          <p:nvPr/>
+        </p:nvSpPr>
+        <p:spPr>
+          <a:xfrm>
+            <a:off x="838200" y="3688864"/>
+            <a:ext cx="4417254" cy="400110"/>
+          </a:xfrm>
+          <a:prstGeom prst="rect">
+            <a:avLst/>
+          </a:prstGeom>
+          <a:noFill/>
+        </p:spPr>
+        <p:txBody>
+          <a:bodyPr wrap="square" rtlCol="0">
+            <a:spAutoFit/>
+          </a:bodyPr>
+          <a:lstStyle/>
+          <a:p>
+            <a:r>
+              <a:rPr lang="es-ES" sz="2000" dirty="0">
+                <a:solidFill>
+                  <a:srgbClr val="7030A0"/>
+                </a:solidFill>
+                <a:latin typeface="Bahnschrift" panose="020B0502040204020203" pitchFamily="34" charset="0"/>
+              </a:rPr>
+              <a:t>1. Pagina principal de ingreso de PIN.</a:t>
+            </a:r>
+            <a:endParaRPr lang="es-CO" sz="2000" dirty="0">
+              <a:solidFill>
+                <a:srgbClr val="7030A0"/>
+              </a:solidFill>
+              <a:latin typeface="Bahnschrift" panose="020B0502040204020203" pitchFamily="34" charset="0"/>
+            </a:endParaRPr>
+          </a:p>
+        </p:txBody>
+      </p:sp>
+      <p:sp>
+        <p:nvSpPr>
+          <p:cNvPr id="9" name="CuadroTexto 8">
+            <a:extLst>
+              <a:ext uri="{FF2B5EF4-FFF2-40B4-BE49-F238E27FC236}">
+                <a16:creationId xmlns:a16="http://schemas.microsoft.com/office/drawing/2014/main" id="{1593180C-7650-0907-AE33-5F123A083C4E}"/>
+              </a:ext>
+            </a:extLst>
+          </p:cNvPr>
+          <p:cNvSpPr txBox="1"/>
+          <p:nvPr/>
+        </p:nvSpPr>
+        <p:spPr>
+          <a:xfrm>
+            <a:off x="6302325" y="1465389"/>
+            <a:ext cx="5051475" cy="707886"/>
+          </a:xfrm>
+          <a:prstGeom prst="rect">
+            <a:avLst/>
+          </a:prstGeom>
+          <a:noFill/>
+        </p:spPr>
+        <p:txBody>
+          <a:bodyPr wrap="square">
+            <a:spAutoFit/>
+          </a:bodyPr>
+          <a:lstStyle/>
+          <a:p>
+            <a:r>
+              <a:rPr lang="es-ES" sz="2000" dirty="0">
+                <a:solidFill>
+                  <a:srgbClr val="7030A0"/>
+                </a:solidFill>
+                <a:latin typeface="Bahnschrift" panose="020B0502040204020203" pitchFamily="34" charset="0"/>
+              </a:rPr>
+              <a:t>2. Pagina preguntas tipo FALSO o VERDADERO</a:t>
+            </a:r>
+            <a:endParaRPr lang="es-CO" sz="2000" dirty="0">
+              <a:solidFill>
+                <a:srgbClr val="7030A0"/>
+              </a:solidFill>
+              <a:latin typeface="Bahnschrift" panose="020B0502040204020203" pitchFamily="34" charset="0"/>
+            </a:endParaRPr>
+          </a:p>
+        </p:txBody>
+      </p:sp>
+      <p:sp>
+        <p:nvSpPr>
+          <p:cNvPr id="11" name="CuadroTexto 10">
+            <a:extLst>
+              <a:ext uri="{FF2B5EF4-FFF2-40B4-BE49-F238E27FC236}">
+                <a16:creationId xmlns:a16="http://schemas.microsoft.com/office/drawing/2014/main" id="{BA6228E8-D176-3BDC-5F41-96FF1C35005D}"/>
+              </a:ext>
+            </a:extLst>
+          </p:cNvPr>
+          <p:cNvSpPr txBox="1"/>
+          <p:nvPr/>
+        </p:nvSpPr>
+        <p:spPr>
+          <a:xfrm>
+            <a:off x="7214554" y="5192556"/>
+            <a:ext cx="4677163" cy="707886"/>
+          </a:xfrm>
+          <a:prstGeom prst="rect">
+            <a:avLst/>
+          </a:prstGeom>
+          <a:noFill/>
+        </p:spPr>
+        <p:txBody>
+          <a:bodyPr wrap="square">
+            <a:spAutoFit/>
+          </a:bodyPr>
+          <a:lstStyle/>
+          <a:p>
+            <a:pPr marL="0" marR="0" lvl="0" indent="0" algn="l" defTabSz="914400" rtl="0" eaLnBrk="1" fontAlgn="auto" latinLnBrk="0" hangingPunct="1">
+              <a:lnSpc>
+                <a:spcPct val="100000"/>
+              </a:lnSpc>
+              <a:spcBef>
+                <a:spcPts val="0"/>
+              </a:spcBef>
+              <a:spcAft>
+                <a:spcPts val="0"/>
+              </a:spcAft>
+              <a:buClrTx/>
+              <a:buSzTx/>
+              <a:buFontTx/>
+              <a:buNone/>
+              <a:tabLst/>
+              <a:defRPr/>
+            </a:pPr>
+            <a:r>
+              <a:rPr lang="es-ES" sz="2000" dirty="0">
+                <a:solidFill>
+                  <a:srgbClr val="7030A0"/>
+                </a:solidFill>
+                <a:latin typeface="Bahnschrift" panose="020B0502040204020203" pitchFamily="34" charset="0"/>
+              </a:rPr>
+              <a:t>3</a:t>
+            </a:r>
+            <a:r>
+              <a:rPr kumimoji="0" lang="es-ES" sz="2000" b="0" i="0" u="none" strike="noStrike" kern="1200" cap="none" spc="0" normalizeH="0" baseline="0" noProof="0" dirty="0">
+                <a:ln>
+                  <a:noFill/>
+                </a:ln>
+                <a:solidFill>
+                  <a:srgbClr val="7030A0"/>
+                </a:solidFill>
+                <a:effectLst/>
+                <a:uLnTx/>
+                <a:uFillTx/>
+                <a:latin typeface="Bahnschrift" panose="020B0502040204020203" pitchFamily="34" charset="0"/>
+                <a:ea typeface="+mn-ea"/>
+                <a:cs typeface="+mn-cs"/>
+              </a:rPr>
+              <a:t>. Pagina preguntas con 4 OPCIONES DE RESPUESTA</a:t>
+            </a:r>
+            <a:endParaRPr kumimoji="0" lang="es-CO" sz="2000" b="0" i="0" u="none" strike="noStrike" kern="1200" cap="none" spc="0" normalizeH="0" baseline="0" noProof="0" dirty="0">
+              <a:ln>
+                <a:noFill/>
+              </a:ln>
+              <a:solidFill>
+                <a:srgbClr val="7030A0"/>
+              </a:solidFill>
+              <a:effectLst/>
+              <a:uLnTx/>
+              <a:uFillTx/>
+              <a:latin typeface="Bahnschrift" panose="020B0502040204020203" pitchFamily="34" charset="0"/>
+              <a:ea typeface="+mn-ea"/>
+              <a:cs typeface="+mn-cs"/>
+            </a:endParaRPr>
+          </a:p>
+        </p:txBody>
+      </p:sp>
+    </p:spTree>
+    <p:extLst>
+      <p:ext uri="{BB962C8B-B14F-4D97-AF65-F5344CB8AC3E}">
+        <p14:creationId xmlns:p14="http://schemas.microsoft.com/office/powerpoint/2010/main" val="406387641"/>
+      </p:ext>
+    </p:extLst>
+  </p:cSld>
+  <p:clrMapOvr>
+    <a:masterClrMapping/>
+  </p:clrMapOvr>
+</p:sld>
+</file>
+
+<file path=ppt/slides/slide4.xml><?xml version="1.0" encoding="utf-8"?>
+<p:sld xmlns:a="http://schemas.openxmlformats.org/drawingml/2006/main" xmlns:r="http://schemas.openxmlformats.org/officeDocument/2006/relationships" xmlns:p="http://schemas.openxmlformats.org/presentationml/2006/main">
+  <p:cSld>
+    <p:spTree>
+      <p:nvGrpSpPr>
+        <p:cNvPr id="1" name=""/>
+        <p:cNvGrpSpPr/>
+        <p:nvPr/>
+      </p:nvGrpSpPr>
+      <p:grpSpPr>
+        <a:xfrm>
+          <a:off x="0" y="0"/>
+          <a:ext cx="0" cy="0"/>
+          <a:chOff x="0" y="0"/>
+          <a:chExt cx="0" cy="0"/>
+        </a:xfrm>
+      </p:grpSpPr>
+    </p:spTree>
+    <p:extLst>
+      <p:ext uri="{BB962C8B-B14F-4D97-AF65-F5344CB8AC3E}">
+        <p14:creationId xmlns:p14="http://schemas.microsoft.com/office/powerpoint/2010/main" val="4067705731"/>
       </p:ext>
     </p:extLst>
   </p:cSld>

</xml_diff>